<commit_message>
ppt 및 readme 업뎃
</commit_message>
<xml_diff>
--- a/2주차(09_18)/6조_09_18_발표ppt.pptx
+++ b/2주차(09_18)/6조_09_18_발표ppt.pptx
@@ -236,7 +236,7 @@
           <a:p>
             <a:fld id="{17FB36FB-C10C-479A-9DFD-15DEB134881C}" type="datetimeFigureOut">
               <a:rPr lang="ko-KR" altLang="en-US" smtClean="0"/>
-              <a:t>2018-09-13</a:t>
+              <a:t>2018-09-15</a:t>
             </a:fld>
             <a:endParaRPr lang="ko-KR" altLang="en-US"/>
           </a:p>
@@ -2697,7 +2697,7 @@
         </p:nvSpPr>
         <p:spPr>
           <a:xfrm>
-            <a:off x="2706750" y="4635795"/>
+            <a:off x="2697872" y="5684186"/>
             <a:ext cx="1127051" cy="369332"/>
           </a:xfrm>
           <a:prstGeom prst="rect">
@@ -2716,52 +2716,6 @@
               <a:t>스플래쉬</a:t>
             </a:r>
             <a:endParaRPr lang="ko-KR" altLang="en-US" dirty="0"/>
-          </a:p>
-        </p:txBody>
-      </p:sp>
-      <p:sp>
-        <p:nvSpPr>
-          <p:cNvPr id="3" name="직사각형 2">
-            <a:extLst>
-              <a:ext uri="{FF2B5EF4-FFF2-40B4-BE49-F238E27FC236}">
-                <a16:creationId xmlns:a16="http://schemas.microsoft.com/office/drawing/2014/main" id="{B75A0B99-4152-4F69-B8C3-9701B954EC78}"/>
-              </a:ext>
-            </a:extLst>
-          </p:cNvPr>
-          <p:cNvSpPr/>
-          <p:nvPr/>
-        </p:nvSpPr>
-        <p:spPr>
-          <a:xfrm>
-            <a:off x="2073349" y="1945758"/>
-            <a:ext cx="2434856" cy="2402940"/>
-          </a:xfrm>
-          <a:prstGeom prst="rect">
-            <a:avLst/>
-          </a:prstGeom>
-        </p:spPr>
-        <p:style>
-          <a:lnRef idx="2">
-            <a:schemeClr val="accent1">
-              <a:shade val="50000"/>
-            </a:schemeClr>
-          </a:lnRef>
-          <a:fillRef idx="1">
-            <a:schemeClr val="accent1"/>
-          </a:fillRef>
-          <a:effectRef idx="0">
-            <a:schemeClr val="accent1"/>
-          </a:effectRef>
-          <a:fontRef idx="minor">
-            <a:schemeClr val="lt1"/>
-          </a:fontRef>
-        </p:style>
-        <p:txBody>
-          <a:bodyPr rtlCol="0" anchor="ctr"/>
-          <a:lstStyle/>
-          <a:p>
-            <a:pPr algn="ctr"/>
-            <a:endParaRPr lang="ko-KR" altLang="en-US"/>
           </a:p>
         </p:txBody>
       </p:sp>
@@ -2779,7 +2733,7 @@
         </p:nvSpPr>
         <p:spPr>
           <a:xfrm>
-            <a:off x="8458199" y="4635795"/>
+            <a:off x="8458199" y="5684186"/>
             <a:ext cx="1127051" cy="369332"/>
           </a:xfrm>
           <a:prstGeom prst="rect">
@@ -2801,52 +2755,78 @@
           </a:p>
         </p:txBody>
       </p:sp>
-      <p:sp>
-        <p:nvSpPr>
-          <p:cNvPr id="22" name="직사각형 21">
+      <p:pic>
+        <p:nvPicPr>
+          <p:cNvPr id="5" name="그림 4">
             <a:extLst>
               <a:ext uri="{FF2B5EF4-FFF2-40B4-BE49-F238E27FC236}">
-                <a16:creationId xmlns:a16="http://schemas.microsoft.com/office/drawing/2014/main" id="{FCEDF5E6-4872-4E92-A43E-4D18540FBB3E}"/>
+                <a16:creationId xmlns:a16="http://schemas.microsoft.com/office/drawing/2014/main" id="{4F8E33C8-41FB-41F7-8C40-A939FED5B74D}"/>
               </a:ext>
             </a:extLst>
           </p:cNvPr>
-          <p:cNvSpPr/>
-          <p:nvPr/>
-        </p:nvSpPr>
-        <p:spPr>
-          <a:xfrm>
-            <a:off x="7804297" y="1945758"/>
-            <a:ext cx="2434856" cy="2402940"/>
+          <p:cNvPicPr>
+            <a:picLocks noChangeAspect="1"/>
+          </p:cNvPicPr>
+          <p:nvPr/>
+        </p:nvPicPr>
+        <p:blipFill>
+          <a:blip r:embed="rId3" cstate="print">
+            <a:extLst>
+              <a:ext uri="{28A0092B-C50C-407E-A947-70E740481C1C}">
+                <a14:useLocalDpi xmlns:a14="http://schemas.microsoft.com/office/drawing/2010/main" val="0"/>
+              </a:ext>
+            </a:extLst>
+          </a:blip>
+          <a:stretch>
+            <a:fillRect/>
+          </a:stretch>
+        </p:blipFill>
+        <p:spPr>
+          <a:xfrm>
+            <a:off x="2304768" y="1540904"/>
+            <a:ext cx="1913258" cy="3932808"/>
           </a:xfrm>
           <a:prstGeom prst="rect">
             <a:avLst/>
           </a:prstGeom>
         </p:spPr>
-        <p:style>
-          <a:lnRef idx="2">
-            <a:schemeClr val="accent1">
-              <a:shade val="50000"/>
-            </a:schemeClr>
-          </a:lnRef>
-          <a:fillRef idx="1">
-            <a:schemeClr val="accent1"/>
-          </a:fillRef>
-          <a:effectRef idx="0">
-            <a:schemeClr val="accent1"/>
-          </a:effectRef>
-          <a:fontRef idx="minor">
-            <a:schemeClr val="lt1"/>
-          </a:fontRef>
-        </p:style>
-        <p:txBody>
-          <a:bodyPr rtlCol="0" anchor="ctr"/>
-          <a:lstStyle/>
-          <a:p>
-            <a:pPr algn="ctr"/>
-            <a:endParaRPr lang="ko-KR" altLang="en-US"/>
-          </a:p>
-        </p:txBody>
-      </p:sp>
+      </p:pic>
+      <p:pic>
+        <p:nvPicPr>
+          <p:cNvPr id="7" name="그림 6">
+            <a:extLst>
+              <a:ext uri="{FF2B5EF4-FFF2-40B4-BE49-F238E27FC236}">
+                <a16:creationId xmlns:a16="http://schemas.microsoft.com/office/drawing/2014/main" id="{0A57E965-4869-4B11-B856-C42FE277AC65}"/>
+              </a:ext>
+            </a:extLst>
+          </p:cNvPr>
+          <p:cNvPicPr>
+            <a:picLocks noChangeAspect="1"/>
+          </p:cNvPicPr>
+          <p:nvPr/>
+        </p:nvPicPr>
+        <p:blipFill>
+          <a:blip r:embed="rId4" cstate="print">
+            <a:extLst>
+              <a:ext uri="{28A0092B-C50C-407E-A947-70E740481C1C}">
+                <a14:useLocalDpi xmlns:a14="http://schemas.microsoft.com/office/drawing/2010/main" val="0"/>
+              </a:ext>
+            </a:extLst>
+          </a:blip>
+          <a:stretch>
+            <a:fillRect/>
+          </a:stretch>
+        </p:blipFill>
+        <p:spPr>
+          <a:xfrm>
+            <a:off x="8065095" y="1540904"/>
+            <a:ext cx="1913258" cy="3932808"/>
+          </a:xfrm>
+          <a:prstGeom prst="rect">
+            <a:avLst/>
+          </a:prstGeom>
+        </p:spPr>
+      </p:pic>
     </p:spTree>
     <p:extLst>
       <p:ext uri="{BB962C8B-B14F-4D97-AF65-F5344CB8AC3E}">
@@ -3155,7 +3135,7 @@
         </p:nvSpPr>
         <p:spPr>
           <a:xfrm>
-            <a:off x="2868391" y="4635795"/>
+            <a:off x="2868391" y="5603461"/>
             <a:ext cx="1388559" cy="369332"/>
           </a:xfrm>
           <a:prstGeom prst="rect">
@@ -3169,57 +3149,11 @@
           </a:bodyPr>
           <a:lstStyle/>
           <a:p>
+            <a:pPr algn="ctr"/>
             <a:r>
-              <a:rPr lang="ko-KR" altLang="en-US"/>
+              <a:rPr lang="ko-KR" altLang="en-US" dirty="0"/>
               <a:t>지도 화면</a:t>
             </a:r>
-            <a:endParaRPr lang="ko-KR" altLang="en-US" dirty="0"/>
-          </a:p>
-        </p:txBody>
-      </p:sp>
-      <p:sp>
-        <p:nvSpPr>
-          <p:cNvPr id="3" name="직사각형 2">
-            <a:extLst>
-              <a:ext uri="{FF2B5EF4-FFF2-40B4-BE49-F238E27FC236}">
-                <a16:creationId xmlns:a16="http://schemas.microsoft.com/office/drawing/2014/main" id="{B75A0B99-4152-4F69-B8C3-9701B954EC78}"/>
-              </a:ext>
-            </a:extLst>
-          </p:cNvPr>
-          <p:cNvSpPr/>
-          <p:nvPr/>
-        </p:nvSpPr>
-        <p:spPr>
-          <a:xfrm>
-            <a:off x="2345243" y="1945758"/>
-            <a:ext cx="2434856" cy="2402940"/>
-          </a:xfrm>
-          <a:prstGeom prst="rect">
-            <a:avLst/>
-          </a:prstGeom>
-        </p:spPr>
-        <p:style>
-          <a:lnRef idx="2">
-            <a:schemeClr val="accent1">
-              <a:shade val="50000"/>
-            </a:schemeClr>
-          </a:lnRef>
-          <a:fillRef idx="1">
-            <a:schemeClr val="accent1"/>
-          </a:fillRef>
-          <a:effectRef idx="0">
-            <a:schemeClr val="accent1"/>
-          </a:effectRef>
-          <a:fontRef idx="minor">
-            <a:schemeClr val="lt1"/>
-          </a:fontRef>
-        </p:style>
-        <p:txBody>
-          <a:bodyPr rtlCol="0" anchor="ctr"/>
-          <a:lstStyle/>
-          <a:p>
-            <a:pPr algn="ctr"/>
-            <a:endParaRPr lang="ko-KR" altLang="en-US"/>
           </a:p>
         </p:txBody>
       </p:sp>
@@ -3237,7 +3171,7 @@
         </p:nvSpPr>
         <p:spPr>
           <a:xfrm>
-            <a:off x="8325293" y="4635795"/>
+            <a:off x="8351926" y="5603461"/>
             <a:ext cx="1521464" cy="369332"/>
           </a:xfrm>
           <a:prstGeom prst="rect">
@@ -3251,60 +3185,86 @@
           </a:bodyPr>
           <a:lstStyle/>
           <a:p>
+            <a:pPr algn="ctr"/>
             <a:r>
-              <a:rPr lang="ko-KR" altLang="en-US"/>
+              <a:rPr lang="ko-KR" altLang="en-US" dirty="0"/>
               <a:t>카메라 화면</a:t>
             </a:r>
-            <a:endParaRPr lang="ko-KR" altLang="en-US" dirty="0"/>
-          </a:p>
-        </p:txBody>
-      </p:sp>
-      <p:sp>
-        <p:nvSpPr>
-          <p:cNvPr id="22" name="직사각형 21">
+          </a:p>
+        </p:txBody>
+      </p:sp>
+      <p:pic>
+        <p:nvPicPr>
+          <p:cNvPr id="5" name="그림 4">
             <a:extLst>
               <a:ext uri="{FF2B5EF4-FFF2-40B4-BE49-F238E27FC236}">
-                <a16:creationId xmlns:a16="http://schemas.microsoft.com/office/drawing/2014/main" id="{FCEDF5E6-4872-4E92-A43E-4D18540FBB3E}"/>
+                <a16:creationId xmlns:a16="http://schemas.microsoft.com/office/drawing/2014/main" id="{A567F50E-ABBB-4FFE-990B-A41A077DC07C}"/>
               </a:ext>
             </a:extLst>
           </p:cNvPr>
-          <p:cNvSpPr/>
-          <p:nvPr/>
-        </p:nvSpPr>
-        <p:spPr>
-          <a:xfrm>
-            <a:off x="7804297" y="1945758"/>
-            <a:ext cx="2434856" cy="2402940"/>
+          <p:cNvPicPr>
+            <a:picLocks noChangeAspect="1"/>
+          </p:cNvPicPr>
+          <p:nvPr/>
+        </p:nvPicPr>
+        <p:blipFill>
+          <a:blip r:embed="rId3" cstate="print">
+            <a:extLst>
+              <a:ext uri="{28A0092B-C50C-407E-A947-70E740481C1C}">
+                <a14:useLocalDpi xmlns:a14="http://schemas.microsoft.com/office/drawing/2010/main" val="0"/>
+              </a:ext>
+            </a:extLst>
+          </a:blip>
+          <a:stretch>
+            <a:fillRect/>
+          </a:stretch>
+        </p:blipFill>
+        <p:spPr>
+          <a:xfrm>
+            <a:off x="2654185" y="1642371"/>
+            <a:ext cx="1816969" cy="3734881"/>
           </a:xfrm>
           <a:prstGeom prst="rect">
             <a:avLst/>
           </a:prstGeom>
         </p:spPr>
-        <p:style>
-          <a:lnRef idx="2">
-            <a:schemeClr val="accent1">
-              <a:shade val="50000"/>
-            </a:schemeClr>
-          </a:lnRef>
-          <a:fillRef idx="1">
-            <a:schemeClr val="accent1"/>
-          </a:fillRef>
-          <a:effectRef idx="0">
-            <a:schemeClr val="accent1"/>
-          </a:effectRef>
-          <a:fontRef idx="minor">
-            <a:schemeClr val="lt1"/>
-          </a:fontRef>
-        </p:style>
-        <p:txBody>
-          <a:bodyPr rtlCol="0" anchor="ctr"/>
-          <a:lstStyle/>
-          <a:p>
-            <a:pPr algn="ctr"/>
-            <a:endParaRPr lang="ko-KR" altLang="en-US"/>
-          </a:p>
-        </p:txBody>
-      </p:sp>
+      </p:pic>
+      <p:pic>
+        <p:nvPicPr>
+          <p:cNvPr id="7" name="그림 6">
+            <a:extLst>
+              <a:ext uri="{FF2B5EF4-FFF2-40B4-BE49-F238E27FC236}">
+                <a16:creationId xmlns:a16="http://schemas.microsoft.com/office/drawing/2014/main" id="{E6BAF28F-86D8-49D8-A4B4-3D819AE65446}"/>
+              </a:ext>
+            </a:extLst>
+          </p:cNvPr>
+          <p:cNvPicPr>
+            <a:picLocks noChangeAspect="1"/>
+          </p:cNvPicPr>
+          <p:nvPr/>
+        </p:nvPicPr>
+        <p:blipFill>
+          <a:blip r:embed="rId4" cstate="print">
+            <a:extLst>
+              <a:ext uri="{28A0092B-C50C-407E-A947-70E740481C1C}">
+                <a14:useLocalDpi xmlns:a14="http://schemas.microsoft.com/office/drawing/2010/main" val="0"/>
+              </a:ext>
+            </a:extLst>
+          </a:blip>
+          <a:stretch>
+            <a:fillRect/>
+          </a:stretch>
+        </p:blipFill>
+        <p:spPr>
+          <a:xfrm>
+            <a:off x="8200847" y="1642371"/>
+            <a:ext cx="1816969" cy="3734882"/>
+          </a:xfrm>
+          <a:prstGeom prst="rect">
+            <a:avLst/>
+          </a:prstGeom>
+        </p:spPr>
+      </p:pic>
     </p:spTree>
     <p:extLst>
       <p:ext uri="{BB962C8B-B14F-4D97-AF65-F5344CB8AC3E}">
@@ -5726,52 +5686,6 @@
       </p:cxnSp>
       <p:sp>
         <p:nvSpPr>
-          <p:cNvPr id="22" name="직사각형 21">
-            <a:extLst>
-              <a:ext uri="{FF2B5EF4-FFF2-40B4-BE49-F238E27FC236}">
-                <a16:creationId xmlns:a16="http://schemas.microsoft.com/office/drawing/2014/main" id="{164404BC-924D-43D8-A251-27E4D00F618B}"/>
-              </a:ext>
-            </a:extLst>
-          </p:cNvPr>
-          <p:cNvSpPr/>
-          <p:nvPr/>
-        </p:nvSpPr>
-        <p:spPr>
-          <a:xfrm>
-            <a:off x="8593584" y="1340940"/>
-            <a:ext cx="3120008" cy="3622085"/>
-          </a:xfrm>
-          <a:prstGeom prst="rect">
-            <a:avLst/>
-          </a:prstGeom>
-        </p:spPr>
-        <p:style>
-          <a:lnRef idx="2">
-            <a:schemeClr val="accent1">
-              <a:shade val="50000"/>
-            </a:schemeClr>
-          </a:lnRef>
-          <a:fillRef idx="1">
-            <a:schemeClr val="accent1"/>
-          </a:fillRef>
-          <a:effectRef idx="0">
-            <a:schemeClr val="accent1"/>
-          </a:effectRef>
-          <a:fontRef idx="minor">
-            <a:schemeClr val="lt1"/>
-          </a:fontRef>
-        </p:style>
-        <p:txBody>
-          <a:bodyPr rtlCol="0" anchor="ctr"/>
-          <a:lstStyle/>
-          <a:p>
-            <a:pPr algn="ctr"/>
-            <a:endParaRPr lang="ko-KR" altLang="en-US"/>
-          </a:p>
-        </p:txBody>
-      </p:sp>
-      <p:sp>
-        <p:nvSpPr>
           <p:cNvPr id="23" name="TextBox 22">
             <a:extLst>
               <a:ext uri="{FF2B5EF4-FFF2-40B4-BE49-F238E27FC236}">
@@ -5875,6 +5789,60 @@
           <a:chExt cx="0" cy="0"/>
         </a:xfrm>
       </p:grpSpPr>
+      <p:sp>
+        <p:nvSpPr>
+          <p:cNvPr id="6" name="오각형 5">
+            <a:extLst>
+              <a:ext uri="{FF2B5EF4-FFF2-40B4-BE49-F238E27FC236}">
+                <a16:creationId xmlns:a16="http://schemas.microsoft.com/office/drawing/2014/main" id="{4F7DBAAF-E807-4ABA-A20F-45148967A6BD}"/>
+              </a:ext>
+            </a:extLst>
+          </p:cNvPr>
+          <p:cNvSpPr/>
+          <p:nvPr/>
+        </p:nvSpPr>
+        <p:spPr>
+          <a:xfrm>
+            <a:off x="4529090" y="2037357"/>
+            <a:ext cx="3133817" cy="2583466"/>
+          </a:xfrm>
+          <a:prstGeom prst="pentagon">
+            <a:avLst/>
+          </a:prstGeom>
+          <a:solidFill>
+            <a:schemeClr val="bg1">
+              <a:lumMod val="75000"/>
+            </a:schemeClr>
+          </a:solidFill>
+          <a:ln>
+            <a:noFill/>
+          </a:ln>
+        </p:spPr>
+        <p:style>
+          <a:lnRef idx="2">
+            <a:schemeClr val="accent1">
+              <a:shade val="50000"/>
+            </a:schemeClr>
+          </a:lnRef>
+          <a:fillRef idx="1">
+            <a:schemeClr val="accent1"/>
+          </a:fillRef>
+          <a:effectRef idx="0">
+            <a:schemeClr val="accent1"/>
+          </a:effectRef>
+          <a:fontRef idx="minor">
+            <a:schemeClr val="lt1"/>
+          </a:fontRef>
+        </p:style>
+        <p:txBody>
+          <a:bodyPr rtlCol="0" anchor="ctr"/>
+          <a:lstStyle/>
+          <a:p>
+            <a:pPr algn="ctr"/>
+            <a:endParaRPr lang="ko-KR" altLang="en-US"/>
+          </a:p>
+        </p:txBody>
+      </p:sp>
       <p:cxnSp>
         <p:nvCxnSpPr>
           <p:cNvPr id="4" name="직선 연결선 3"/>
@@ -6190,22 +6158,22 @@
       </p:sp>
       <p:sp>
         <p:nvSpPr>
-          <p:cNvPr id="3" name="TextBox 2">
+          <p:cNvPr id="2" name="사각형: 둥근 모서리 1">
             <a:extLst>
               <a:ext uri="{FF2B5EF4-FFF2-40B4-BE49-F238E27FC236}">
-                <a16:creationId xmlns:a16="http://schemas.microsoft.com/office/drawing/2014/main" id="{300F1B2B-07FF-454E-B535-82E197614F53}"/>
+                <a16:creationId xmlns:a16="http://schemas.microsoft.com/office/drawing/2014/main" id="{1D9E246A-6750-4E4A-9B67-B41618383858}"/>
               </a:ext>
             </a:extLst>
           </p:cNvPr>
-          <p:cNvSpPr txBox="1"/>
-          <p:nvPr/>
-        </p:nvSpPr>
-        <p:spPr>
-          <a:xfrm>
-            <a:off x="4285985" y="2016893"/>
-            <a:ext cx="1313895" cy="369332"/>
-          </a:xfrm>
-          <a:prstGeom prst="rect">
+          <p:cNvSpPr/>
+          <p:nvPr/>
+        </p:nvSpPr>
+        <p:spPr>
+          <a:xfrm>
+            <a:off x="3046519" y="2538242"/>
+            <a:ext cx="1482571" cy="757396"/>
+          </a:xfrm>
+          <a:prstGeom prst="roundRect">
             <a:avLst/>
           </a:prstGeom>
           <a:solidFill>
@@ -6215,18 +6183,29 @@
             <a:noFill/>
           </a:ln>
         </p:spPr>
-        <p:txBody>
-          <a:bodyPr wrap="square" rtlCol="0">
-            <a:spAutoFit/>
-          </a:bodyPr>
+        <p:style>
+          <a:lnRef idx="2">
+            <a:schemeClr val="accent1">
+              <a:shade val="50000"/>
+            </a:schemeClr>
+          </a:lnRef>
+          <a:fillRef idx="1">
+            <a:schemeClr val="accent1"/>
+          </a:fillRef>
+          <a:effectRef idx="0">
+            <a:schemeClr val="accent1"/>
+          </a:effectRef>
+          <a:fontRef idx="minor">
+            <a:schemeClr val="lt1"/>
+          </a:fontRef>
+        </p:style>
+        <p:txBody>
+          <a:bodyPr rtlCol="0" anchor="ctr"/>
           <a:lstStyle/>
           <a:p>
             <a:pPr algn="ctr"/>
             <a:r>
               <a:rPr lang="ko-KR" altLang="en-US" dirty="0">
-                <a:solidFill>
-                  <a:schemeClr val="bg1"/>
-                </a:solidFill>
                 <a:latin typeface="나눔스퀘어 ExtraBold" panose="020B0600000101010101" pitchFamily="50" charset="-127"/>
                 <a:ea typeface="나눔스퀘어 ExtraBold" panose="020B0600000101010101" pitchFamily="50" charset="-127"/>
               </a:rPr>
@@ -6237,22 +6216,22 @@
       </p:sp>
       <p:sp>
         <p:nvSpPr>
-          <p:cNvPr id="14" name="TextBox 13">
+          <p:cNvPr id="17" name="사각형: 둥근 모서리 16">
             <a:extLst>
               <a:ext uri="{FF2B5EF4-FFF2-40B4-BE49-F238E27FC236}">
-                <a16:creationId xmlns:a16="http://schemas.microsoft.com/office/drawing/2014/main" id="{EFFFADE6-A5A2-43FC-8218-B32AECA87128}"/>
+                <a16:creationId xmlns:a16="http://schemas.microsoft.com/office/drawing/2014/main" id="{B9E4A2A1-A5DB-4A59-B220-2DC697D8C6E7}"/>
               </a:ext>
             </a:extLst>
           </p:cNvPr>
-          <p:cNvSpPr txBox="1"/>
-          <p:nvPr/>
-        </p:nvSpPr>
-        <p:spPr>
-          <a:xfrm>
-            <a:off x="6281592" y="1554870"/>
-            <a:ext cx="1313895" cy="369332"/>
-          </a:xfrm>
-          <a:prstGeom prst="rect">
+          <p:cNvSpPr/>
+          <p:nvPr/>
+        </p:nvSpPr>
+        <p:spPr>
+          <a:xfrm>
+            <a:off x="5354714" y="1279961"/>
+            <a:ext cx="1482571" cy="757396"/>
+          </a:xfrm>
+          <a:prstGeom prst="roundRect">
             <a:avLst/>
           </a:prstGeom>
           <a:solidFill>
@@ -6262,18 +6241,29 @@
             <a:noFill/>
           </a:ln>
         </p:spPr>
-        <p:txBody>
-          <a:bodyPr wrap="square" rtlCol="0">
-            <a:spAutoFit/>
-          </a:bodyPr>
+        <p:style>
+          <a:lnRef idx="2">
+            <a:schemeClr val="accent1">
+              <a:shade val="50000"/>
+            </a:schemeClr>
+          </a:lnRef>
+          <a:fillRef idx="1">
+            <a:schemeClr val="accent1"/>
+          </a:fillRef>
+          <a:effectRef idx="0">
+            <a:schemeClr val="accent1"/>
+          </a:effectRef>
+          <a:fontRef idx="minor">
+            <a:schemeClr val="lt1"/>
+          </a:fontRef>
+        </p:style>
+        <p:txBody>
+          <a:bodyPr rtlCol="0" anchor="ctr"/>
           <a:lstStyle/>
           <a:p>
             <a:pPr algn="ctr"/>
             <a:r>
               <a:rPr lang="ko-KR" altLang="en-US" dirty="0">
-                <a:solidFill>
-                  <a:schemeClr val="bg1"/>
-                </a:solidFill>
                 <a:latin typeface="나눔스퀘어 ExtraBold" panose="020B0600000101010101" pitchFamily="50" charset="-127"/>
                 <a:ea typeface="나눔스퀘어 ExtraBold" panose="020B0600000101010101" pitchFamily="50" charset="-127"/>
               </a:rPr>
@@ -6281,18 +6271,12 @@
             </a:r>
             <a:r>
               <a:rPr lang="ko-KR" altLang="en-US" dirty="0" err="1">
-                <a:solidFill>
-                  <a:schemeClr val="bg1"/>
-                </a:solidFill>
                 <a:latin typeface="나눔스퀘어 ExtraBold" panose="020B0600000101010101" pitchFamily="50" charset="-127"/>
                 <a:ea typeface="나눔스퀘어 ExtraBold" panose="020B0600000101010101" pitchFamily="50" charset="-127"/>
               </a:rPr>
               <a:t>길찾기</a:t>
             </a:r>
             <a:endParaRPr lang="ko-KR" altLang="en-US" dirty="0">
-              <a:solidFill>
-                <a:schemeClr val="bg1"/>
-              </a:solidFill>
               <a:latin typeface="나눔스퀘어 ExtraBold" panose="020B0600000101010101" pitchFamily="50" charset="-127"/>
               <a:ea typeface="나눔스퀘어 ExtraBold" panose="020B0600000101010101" pitchFamily="50" charset="-127"/>
             </a:endParaRPr>
@@ -6301,22 +6285,22 @@
       </p:sp>
       <p:sp>
         <p:nvSpPr>
-          <p:cNvPr id="15" name="TextBox 14">
+          <p:cNvPr id="18" name="사각형: 둥근 모서리 17">
             <a:extLst>
               <a:ext uri="{FF2B5EF4-FFF2-40B4-BE49-F238E27FC236}">
-                <a16:creationId xmlns:a16="http://schemas.microsoft.com/office/drawing/2014/main" id="{D1320E51-FD2B-4BA3-BD39-AFE59C08ACAD}"/>
+                <a16:creationId xmlns:a16="http://schemas.microsoft.com/office/drawing/2014/main" id="{BB43C7D6-D1AF-4834-901B-7DCD4A4057A1}"/>
               </a:ext>
             </a:extLst>
           </p:cNvPr>
-          <p:cNvSpPr txBox="1"/>
-          <p:nvPr/>
-        </p:nvSpPr>
-        <p:spPr>
-          <a:xfrm>
-            <a:off x="7511988" y="2664781"/>
-            <a:ext cx="1685077" cy="369332"/>
-          </a:xfrm>
-          <a:prstGeom prst="rect">
+          <p:cNvSpPr/>
+          <p:nvPr/>
+        </p:nvSpPr>
+        <p:spPr>
+          <a:xfrm>
+            <a:off x="7679825" y="2498224"/>
+            <a:ext cx="1482571" cy="757396"/>
+          </a:xfrm>
+          <a:prstGeom prst="roundRect">
             <a:avLst/>
           </a:prstGeom>
           <a:solidFill>
@@ -6326,37 +6310,49 @@
             <a:noFill/>
           </a:ln>
         </p:spPr>
-        <p:txBody>
-          <a:bodyPr wrap="square" rtlCol="0">
-            <a:spAutoFit/>
-          </a:bodyPr>
+        <p:style>
+          <a:lnRef idx="2">
+            <a:schemeClr val="accent1">
+              <a:shade val="50000"/>
+            </a:schemeClr>
+          </a:lnRef>
+          <a:fillRef idx="1">
+            <a:schemeClr val="accent1"/>
+          </a:fillRef>
+          <a:effectRef idx="0">
+            <a:schemeClr val="accent1"/>
+          </a:effectRef>
+          <a:fontRef idx="minor">
+            <a:schemeClr val="lt1"/>
+          </a:fontRef>
+        </p:style>
+        <p:txBody>
+          <a:bodyPr rtlCol="0" anchor="ctr"/>
           <a:lstStyle/>
           <a:p>
             <a:pPr algn="ctr"/>
             <a:r>
-              <a:rPr lang="ko-KR" altLang="en-US">
-                <a:solidFill>
-                  <a:schemeClr val="bg1"/>
-                </a:solidFill>
+              <a:rPr lang="ko-KR" altLang="en-US" dirty="0">
                 <a:latin typeface="나눔스퀘어 ExtraBold" panose="020B0600000101010101" pitchFamily="50" charset="-127"/>
                 <a:ea typeface="나눔스퀘어 ExtraBold" panose="020B0600000101010101" pitchFamily="50" charset="-127"/>
               </a:rPr>
-              <a:t>길 안내 </a:t>
+              <a:t>길 안내</a:t>
             </a:r>
+            <a:endParaRPr lang="en-US" altLang="ko-KR" dirty="0">
+              <a:latin typeface="나눔스퀘어 ExtraBold" panose="020B0600000101010101" pitchFamily="50" charset="-127"/>
+              <a:ea typeface="나눔스퀘어 ExtraBold" panose="020B0600000101010101" pitchFamily="50" charset="-127"/>
+            </a:endParaRPr>
+          </a:p>
+          <a:p>
+            <a:pPr algn="ctr"/>
             <a:r>
               <a:rPr lang="ko-KR" altLang="en-US" dirty="0" err="1">
-                <a:solidFill>
-                  <a:schemeClr val="bg1"/>
-                </a:solidFill>
                 <a:latin typeface="나눔스퀘어 ExtraBold" panose="020B0600000101010101" pitchFamily="50" charset="-127"/>
                 <a:ea typeface="나눔스퀘어 ExtraBold" panose="020B0600000101010101" pitchFamily="50" charset="-127"/>
               </a:rPr>
               <a:t>메세지</a:t>
             </a:r>
             <a:endParaRPr lang="ko-KR" altLang="en-US" dirty="0">
-              <a:solidFill>
-                <a:schemeClr val="bg1"/>
-              </a:solidFill>
               <a:latin typeface="나눔스퀘어 ExtraBold" panose="020B0600000101010101" pitchFamily="50" charset="-127"/>
               <a:ea typeface="나눔스퀘어 ExtraBold" panose="020B0600000101010101" pitchFamily="50" charset="-127"/>
             </a:endParaRPr>
@@ -6365,22 +6361,22 @@
       </p:sp>
       <p:sp>
         <p:nvSpPr>
-          <p:cNvPr id="16" name="TextBox 15">
+          <p:cNvPr id="24" name="사각형: 둥근 모서리 23">
             <a:extLst>
               <a:ext uri="{FF2B5EF4-FFF2-40B4-BE49-F238E27FC236}">
-                <a16:creationId xmlns:a16="http://schemas.microsoft.com/office/drawing/2014/main" id="{F19BD131-40F6-445C-8DDB-764FC70CEAD1}"/>
+                <a16:creationId xmlns:a16="http://schemas.microsoft.com/office/drawing/2014/main" id="{F7D892FD-4F24-4BD5-A84E-0F1CD7A82D78}"/>
               </a:ext>
             </a:extLst>
           </p:cNvPr>
-          <p:cNvSpPr txBox="1"/>
-          <p:nvPr/>
-        </p:nvSpPr>
-        <p:spPr>
-          <a:xfrm>
-            <a:off x="7151604" y="4080265"/>
-            <a:ext cx="1422545" cy="369332"/>
-          </a:xfrm>
-          <a:prstGeom prst="rect">
+          <p:cNvSpPr/>
+          <p:nvPr/>
+        </p:nvSpPr>
+        <p:spPr>
+          <a:xfrm>
+            <a:off x="3729509" y="4620823"/>
+            <a:ext cx="1482571" cy="757396"/>
+          </a:xfrm>
+          <a:prstGeom prst="roundRect">
             <a:avLst/>
           </a:prstGeom>
           <a:solidFill>
@@ -6390,51 +6386,55 @@
             <a:noFill/>
           </a:ln>
         </p:spPr>
-        <p:txBody>
-          <a:bodyPr wrap="square" rtlCol="0">
-            <a:spAutoFit/>
-          </a:bodyPr>
+        <p:style>
+          <a:lnRef idx="2">
+            <a:schemeClr val="accent1">
+              <a:shade val="50000"/>
+            </a:schemeClr>
+          </a:lnRef>
+          <a:fillRef idx="1">
+            <a:schemeClr val="accent1"/>
+          </a:fillRef>
+          <a:effectRef idx="0">
+            <a:schemeClr val="accent1"/>
+          </a:effectRef>
+          <a:fontRef idx="minor">
+            <a:schemeClr val="lt1"/>
+          </a:fontRef>
+        </p:style>
+        <p:txBody>
+          <a:bodyPr rtlCol="0" anchor="ctr"/>
           <a:lstStyle/>
           <a:p>
             <a:pPr algn="ctr"/>
             <a:r>
-              <a:rPr lang="ko-KR" altLang="en-US">
-                <a:solidFill>
-                  <a:schemeClr val="bg1"/>
-                </a:solidFill>
+              <a:rPr lang="ko-KR" altLang="en-US" dirty="0">
                 <a:latin typeface="나눔스퀘어 ExtraBold" panose="020B0600000101010101" pitchFamily="50" charset="-127"/>
                 <a:ea typeface="나눔스퀘어 ExtraBold" panose="020B0600000101010101" pitchFamily="50" charset="-127"/>
               </a:rPr>
-              <a:t>예상 시간</a:t>
+              <a:t>자동 완성</a:t>
             </a:r>
-            <a:endParaRPr lang="ko-KR" altLang="en-US" dirty="0">
-              <a:solidFill>
-                <a:schemeClr val="bg1"/>
-              </a:solidFill>
-              <a:latin typeface="나눔스퀘어 ExtraBold" panose="020B0600000101010101" pitchFamily="50" charset="-127"/>
-              <a:ea typeface="나눔스퀘어 ExtraBold" panose="020B0600000101010101" pitchFamily="50" charset="-127"/>
-            </a:endParaRPr>
-          </a:p>
-        </p:txBody>
-      </p:sp>
-      <p:sp>
-        <p:nvSpPr>
-          <p:cNvPr id="22" name="TextBox 21">
+          </a:p>
+        </p:txBody>
+      </p:sp>
+      <p:sp>
+        <p:nvSpPr>
+          <p:cNvPr id="25" name="사각형: 둥근 모서리 24">
             <a:extLst>
               <a:ext uri="{FF2B5EF4-FFF2-40B4-BE49-F238E27FC236}">
-                <a16:creationId xmlns:a16="http://schemas.microsoft.com/office/drawing/2014/main" id="{FC7E6DD3-B2F0-4946-B682-9B45F3895886}"/>
+                <a16:creationId xmlns:a16="http://schemas.microsoft.com/office/drawing/2014/main" id="{008FBEDD-B4AA-4D9D-BC50-D1EA1F3D407C}"/>
               </a:ext>
             </a:extLst>
           </p:cNvPr>
-          <p:cNvSpPr txBox="1"/>
-          <p:nvPr/>
-        </p:nvSpPr>
-        <p:spPr>
-          <a:xfrm>
-            <a:off x="4673455" y="4434565"/>
-            <a:ext cx="1422545" cy="369332"/>
-          </a:xfrm>
-          <a:prstGeom prst="rect">
+          <p:cNvSpPr/>
+          <p:nvPr/>
+        </p:nvSpPr>
+        <p:spPr>
+          <a:xfrm>
+            <a:off x="6938540" y="4620823"/>
+            <a:ext cx="1482571" cy="757396"/>
+          </a:xfrm>
+          <a:prstGeom prst="roundRect">
             <a:avLst/>
           </a:prstGeom>
           <a:solidFill>
@@ -6444,77 +6444,34 @@
             <a:noFill/>
           </a:ln>
         </p:spPr>
-        <p:txBody>
-          <a:bodyPr wrap="square" rtlCol="0">
-            <a:spAutoFit/>
-          </a:bodyPr>
+        <p:style>
+          <a:lnRef idx="2">
+            <a:schemeClr val="accent1">
+              <a:shade val="50000"/>
+            </a:schemeClr>
+          </a:lnRef>
+          <a:fillRef idx="1">
+            <a:schemeClr val="accent1"/>
+          </a:fillRef>
+          <a:effectRef idx="0">
+            <a:schemeClr val="accent1"/>
+          </a:effectRef>
+          <a:fontRef idx="minor">
+            <a:schemeClr val="lt1"/>
+          </a:fontRef>
+        </p:style>
+        <p:txBody>
+          <a:bodyPr rtlCol="0" anchor="ctr"/>
           <a:lstStyle/>
           <a:p>
             <a:pPr algn="ctr"/>
             <a:r>
               <a:rPr lang="ko-KR" altLang="en-US" dirty="0">
-                <a:solidFill>
-                  <a:schemeClr val="bg1"/>
-                </a:solidFill>
                 <a:latin typeface="나눔스퀘어 ExtraBold" panose="020B0600000101010101" pitchFamily="50" charset="-127"/>
                 <a:ea typeface="나눔스퀘어 ExtraBold" panose="020B0600000101010101" pitchFamily="50" charset="-127"/>
               </a:rPr>
-              <a:t>검색 추천</a:t>
+              <a:t>예상 시간</a:t>
             </a:r>
-          </a:p>
-        </p:txBody>
-      </p:sp>
-      <p:sp>
-        <p:nvSpPr>
-          <p:cNvPr id="23" name="TextBox 22">
-            <a:extLst>
-              <a:ext uri="{FF2B5EF4-FFF2-40B4-BE49-F238E27FC236}">
-                <a16:creationId xmlns:a16="http://schemas.microsoft.com/office/drawing/2014/main" id="{04E582BE-8E8F-40B3-B1C0-0C4E771CF89E}"/>
-              </a:ext>
-            </a:extLst>
-          </p:cNvPr>
-          <p:cNvSpPr txBox="1"/>
-          <p:nvPr/>
-        </p:nvSpPr>
-        <p:spPr>
-          <a:xfrm>
-            <a:off x="3078622" y="3256114"/>
-            <a:ext cx="1313895" cy="369332"/>
-          </a:xfrm>
-          <a:prstGeom prst="rect">
-            <a:avLst/>
-          </a:prstGeom>
-          <a:solidFill>
-            <a:srgbClr val="8DBABD"/>
-          </a:solidFill>
-          <a:ln>
-            <a:noFill/>
-          </a:ln>
-        </p:spPr>
-        <p:txBody>
-          <a:bodyPr wrap="square" rtlCol="0">
-            <a:spAutoFit/>
-          </a:bodyPr>
-          <a:lstStyle/>
-          <a:p>
-            <a:pPr algn="ctr"/>
-            <a:r>
-              <a:rPr lang="ko-KR" altLang="en-US" dirty="0" err="1">
-                <a:solidFill>
-                  <a:schemeClr val="bg1"/>
-                </a:solidFill>
-                <a:latin typeface="나눔스퀘어 ExtraBold" panose="020B0600000101010101" pitchFamily="50" charset="-127"/>
-                <a:ea typeface="나눔스퀘어 ExtraBold" panose="020B0600000101010101" pitchFamily="50" charset="-127"/>
-              </a:rPr>
-              <a:t>즐겨찾기</a:t>
-            </a:r>
-            <a:endParaRPr lang="ko-KR" altLang="en-US" dirty="0">
-              <a:solidFill>
-                <a:schemeClr val="bg1"/>
-              </a:solidFill>
-              <a:latin typeface="나눔스퀘어 ExtraBold" panose="020B0600000101010101" pitchFamily="50" charset="-127"/>
-              <a:ea typeface="나눔스퀘어 ExtraBold" panose="020B0600000101010101" pitchFamily="50" charset="-127"/>
-            </a:endParaRPr>
           </a:p>
         </p:txBody>
       </p:sp>
@@ -7330,6 +7287,42 @@
           <a:chExt cx="0" cy="0"/>
         </a:xfrm>
       </p:grpSpPr>
+      <p:pic>
+        <p:nvPicPr>
+          <p:cNvPr id="7" name="그림 6">
+            <a:extLst>
+              <a:ext uri="{FF2B5EF4-FFF2-40B4-BE49-F238E27FC236}">
+                <a16:creationId xmlns:a16="http://schemas.microsoft.com/office/drawing/2014/main" id="{4A170436-9165-4929-A4B6-B03F2B36EB80}"/>
+              </a:ext>
+            </a:extLst>
+          </p:cNvPr>
+          <p:cNvPicPr>
+            <a:picLocks noChangeAspect="1"/>
+          </p:cNvPicPr>
+          <p:nvPr/>
+        </p:nvPicPr>
+        <p:blipFill>
+          <a:blip r:embed="rId3">
+            <a:extLst>
+              <a:ext uri="{28A0092B-C50C-407E-A947-70E740481C1C}">
+                <a14:useLocalDpi xmlns:a14="http://schemas.microsoft.com/office/drawing/2010/main" val="0"/>
+              </a:ext>
+            </a:extLst>
+          </a:blip>
+          <a:stretch>
+            <a:fillRect/>
+          </a:stretch>
+        </p:blipFill>
+        <p:spPr>
+          <a:xfrm>
+            <a:off x="3249870" y="1270367"/>
+            <a:ext cx="6648732" cy="4998126"/>
+          </a:xfrm>
+          <a:prstGeom prst="rect">
+            <a:avLst/>
+          </a:prstGeom>
+        </p:spPr>
+      </p:pic>
       <p:sp>
         <p:nvSpPr>
           <p:cNvPr id="15" name="TextBox 14"/>
@@ -7373,36 +7366,6 @@
           </a:p>
         </p:txBody>
       </p:sp>
-      <p:pic>
-        <p:nvPicPr>
-          <p:cNvPr id="3" name="그림 2"/>
-          <p:cNvPicPr>
-            <a:picLocks noChangeAspect="1"/>
-          </p:cNvPicPr>
-          <p:nvPr/>
-        </p:nvPicPr>
-        <p:blipFill>
-          <a:blip r:embed="rId3">
-            <a:extLst>
-              <a:ext uri="{28A0092B-C50C-407E-A947-70E740481C1C}">
-                <a14:useLocalDpi xmlns:a14="http://schemas.microsoft.com/office/drawing/2010/main" val="0"/>
-              </a:ext>
-            </a:extLst>
-          </a:blip>
-          <a:stretch>
-            <a:fillRect/>
-          </a:stretch>
-        </p:blipFill>
-        <p:spPr>
-          <a:xfrm>
-            <a:off x="2736576" y="1093264"/>
-            <a:ext cx="6691094" cy="5795215"/>
-          </a:xfrm>
-          <a:prstGeom prst="rect">
-            <a:avLst/>
-          </a:prstGeom>
-        </p:spPr>
-      </p:pic>
       <p:cxnSp>
         <p:nvCxnSpPr>
           <p:cNvPr id="11" name="직선 연결선 10">
@@ -7551,8 +7514,8 @@
         </p:nvSpPr>
         <p:spPr>
           <a:xfrm>
-            <a:off x="5305647" y="1997476"/>
-            <a:ext cx="287285" cy="4696287"/>
+            <a:off x="5808715" y="1864312"/>
+            <a:ext cx="263611" cy="4404181"/>
           </a:xfrm>
           <a:prstGeom prst="rect">
             <a:avLst/>

</xml_diff>